<commit_message>
Improved churn model with XGBoost tuning
</commit_message>
<xml_diff>
--- a/SyriaTel_Churn_Executive_Presentation.pptx
+++ b/SyriaTel_Churn_Executive_Presentation.pptx
@@ -14,7 +14,9 @@
     <p:sldId id="262" r:id="rId8"/>
     <p:sldId id="263" r:id="rId9"/>
     <p:sldId id="264" r:id="rId10"/>
-    <p:sldId id="265" r:id="rId11"/>
+    <p:sldId id="266" r:id="rId11"/>
+    <p:sldId id="267" r:id="rId12"/>
+    <p:sldId id="265" r:id="rId13"/>
   </p:sldIdLst>
   <p:sldSz cx="9144000" cy="6858000" type="screen4x3"/>
   <p:notesSz cx="6858000" cy="9144000"/>
@@ -5864,7 +5866,12 @@
           <a:lstStyle/>
           <a:p>
             <a:r>
-              <a:t>SyriaTel Customer Churn Prediction</a:t>
+              <a:rPr dirty="0" err="1"/>
+              <a:t>SyriaTel</a:t>
+            </a:r>
+            <a:r>
+              <a:rPr dirty="0"/>
+              <a:t> Customer Churn Prediction</a:t>
             </a:r>
           </a:p>
         </p:txBody>
@@ -5911,6 +5918,328 @@
 </file>
 
 <file path=ppt/slides/slide10.xml><?xml version="1.0" encoding="utf-8"?>
+<p:sld xmlns:a="http://schemas.openxmlformats.org/drawingml/2006/main" xmlns:r="http://schemas.openxmlformats.org/officeDocument/2006/relationships" xmlns:p="http://schemas.openxmlformats.org/presentationml/2006/main">
+  <p:cSld>
+    <p:bg>
+      <p:bgPr>
+        <a:blipFill>
+          <a:blip r:embed="rId2"/>
+          <a:stretch/>
+        </a:blipFill>
+        <a:effectLst/>
+      </p:bgPr>
+    </p:bg>
+    <p:spTree>
+      <p:nvGrpSpPr>
+        <p:cNvPr id="1" name=""/>
+        <p:cNvGrpSpPr/>
+        <p:nvPr/>
+      </p:nvGrpSpPr>
+      <p:grpSpPr>
+        <a:xfrm>
+          <a:off x="0" y="0"/>
+          <a:ext cx="0" cy="0"/>
+          <a:chOff x="0" y="0"/>
+          <a:chExt cx="0" cy="0"/>
+        </a:xfrm>
+      </p:grpSpPr>
+      <p:pic>
+        <p:nvPicPr>
+          <p:cNvPr id="36" name="Picture 35">
+            <a:extLst>
+              <a:ext uri="{FF2B5EF4-FFF2-40B4-BE49-F238E27FC236}">
+                <a16:creationId xmlns:a16="http://schemas.microsoft.com/office/drawing/2014/main" id="{A53ED3FC-3BE8-4F1F-BEF1-74B1C721718A}"/>
+              </a:ext>
+              <a:ext uri="{C183D7F6-B498-43B3-948B-1728B52AA6E4}">
+                <adec:decorative xmlns:adec="http://schemas.microsoft.com/office/drawing/2017/decorative" val="1"/>
+              </a:ext>
+            </a:extLst>
+          </p:cNvPr>
+          <p:cNvPicPr>
+            <a:picLocks noGrp="1" noRot="1" noChangeAspect="1" noMove="1" noResize="1" noEditPoints="1" noAdjustHandles="1" noChangeArrowheads="1" noChangeShapeType="1" noCrop="1"/>
+          </p:cNvPicPr>
+          <p:nvPr>
+            <p:extLst>
+              <p:ext uri="{386F3935-93C4-4BCD-93E2-E3B085C9AB24}">
+                <p16:designElem xmlns:p16="http://schemas.microsoft.com/office/powerpoint/2015/main" val="1"/>
+              </p:ext>
+            </p:extLst>
+          </p:nvPr>
+        </p:nvPicPr>
+        <p:blipFill>
+          <a:blip r:embed="rId3">
+            <a:extLst>
+              <a:ext uri="{28A0092B-C50C-407E-A947-70E740481C1C}">
+                <a14:useLocalDpi xmlns:a14="http://schemas.microsoft.com/office/drawing/2010/main" val="0"/>
+              </a:ext>
+            </a:extLst>
+          </a:blip>
+          <a:stretch>
+            <a:fillRect/>
+          </a:stretch>
+        </p:blipFill>
+        <p:spPr>
+          <a:xfrm>
+            <a:off x="0" y="0"/>
+            <a:ext cx="9141618" cy="6856214"/>
+          </a:xfrm>
+          <a:prstGeom prst="rect">
+            <a:avLst/>
+          </a:prstGeom>
+        </p:spPr>
+      </p:pic>
+      <p:sp>
+        <p:nvSpPr>
+          <p:cNvPr id="2" name="Title 1">
+            <a:extLst>
+              <a:ext uri="{FF2B5EF4-FFF2-40B4-BE49-F238E27FC236}">
+                <a16:creationId xmlns:a16="http://schemas.microsoft.com/office/drawing/2014/main" id="{1A2CF566-3329-7C24-32AB-A46916B988A9}"/>
+              </a:ext>
+            </a:extLst>
+          </p:cNvPr>
+          <p:cNvSpPr>
+            <a:spLocks noGrp="1"/>
+          </p:cNvSpPr>
+          <p:nvPr>
+            <p:ph type="title"/>
+          </p:nvPr>
+        </p:nvSpPr>
+        <p:spPr>
+          <a:xfrm>
+            <a:off x="4800600" y="609600"/>
+            <a:ext cx="3860797" cy="1641987"/>
+          </a:xfrm>
+        </p:spPr>
+        <p:txBody>
+          <a:bodyPr vert="horz" lIns="91440" tIns="45720" rIns="91440" bIns="45720" rtlCol="0" anchor="ctr">
+            <a:normAutofit/>
+          </a:bodyPr>
+          <a:lstStyle/>
+          <a:p>
+            <a:r>
+              <a:rPr lang="en-US" sz="3600" b="1"/>
+              <a:t>XGBoost</a:t>
+            </a:r>
+            <a:r>
+              <a:rPr lang="en-US" sz="3600" b="1" dirty="0"/>
+              <a:t> Model</a:t>
+            </a:r>
+            <a:endParaRPr lang="en-US" sz="3600" dirty="0"/>
+          </a:p>
+        </p:txBody>
+      </p:sp>
+      <p:sp>
+        <p:nvSpPr>
+          <p:cNvPr id="4" name="Content Placeholder 3">
+            <a:extLst>
+              <a:ext uri="{FF2B5EF4-FFF2-40B4-BE49-F238E27FC236}">
+                <a16:creationId xmlns:a16="http://schemas.microsoft.com/office/drawing/2014/main" id="{5E16CC63-5A4B-AA0E-03B8-C4D67D465A04}"/>
+              </a:ext>
+            </a:extLst>
+          </p:cNvPr>
+          <p:cNvSpPr>
+            <a:spLocks noGrp="1"/>
+          </p:cNvSpPr>
+          <p:nvPr>
+            <p:ph sz="half" idx="2"/>
+          </p:nvPr>
+        </p:nvSpPr>
+        <p:spPr>
+          <a:xfrm>
+            <a:off x="4800600" y="2251587"/>
+            <a:ext cx="3860797" cy="3637935"/>
+          </a:xfrm>
+        </p:spPr>
+        <p:txBody>
+          <a:bodyPr vert="horz" lIns="91440" tIns="45720" rIns="91440" bIns="45720" rtlCol="0" anchor="ctr">
+            <a:normAutofit/>
+          </a:bodyPr>
+          <a:lstStyle/>
+          <a:p>
+            <a:r>
+              <a:rPr lang="en-US" dirty="0"/>
+              <a:t>The </a:t>
+            </a:r>
+            <a:r>
+              <a:rPr lang="en-US" dirty="0" err="1"/>
+              <a:t>XGBoost</a:t>
+            </a:r>
+            <a:r>
+              <a:rPr lang="en-US" dirty="0"/>
+              <a:t> model achieves 94% overall accuracy and successfully identifies 78% of customers at risk of churn. It significantly reduces missed churn cases while keeping false alerts low. This performance makes the model highly effective for supporting proactive customer retention strategies and reducing revenue loss.</a:t>
+            </a:r>
+          </a:p>
+        </p:txBody>
+      </p:sp>
+      <p:pic>
+        <p:nvPicPr>
+          <p:cNvPr id="6" name="Content Placeholder 5" descr="A chart of a number of colored squares&#10;&#10;AI-generated content may be incorrect.">
+            <a:extLst>
+              <a:ext uri="{FF2B5EF4-FFF2-40B4-BE49-F238E27FC236}">
+                <a16:creationId xmlns:a16="http://schemas.microsoft.com/office/drawing/2014/main" id="{3BEA7631-3F8E-4918-3C3D-45B20B8E3D68}"/>
+              </a:ext>
+            </a:extLst>
+          </p:cNvPr>
+          <p:cNvPicPr>
+            <a:picLocks noGrp="1" noChangeAspect="1"/>
+          </p:cNvPicPr>
+          <p:nvPr>
+            <p:ph sz="half" idx="1"/>
+          </p:nvPr>
+        </p:nvPicPr>
+        <p:blipFill>
+          <a:blip r:embed="rId4"/>
+          <a:stretch>
+            <a:fillRect/>
+          </a:stretch>
+        </p:blipFill>
+        <p:spPr>
+          <a:xfrm>
+            <a:off x="486697" y="1808920"/>
+            <a:ext cx="4085303" cy="2910778"/>
+          </a:xfrm>
+          <a:prstGeom prst="roundRect">
+            <a:avLst>
+              <a:gd name="adj" fmla="val 4380"/>
+            </a:avLst>
+          </a:prstGeom>
+          <a:ln w="50800" cap="sq" cmpd="dbl">
+            <a:gradFill flip="none" rotWithShape="1">
+              <a:gsLst>
+                <a:gs pos="0">
+                  <a:srgbClr val="FFFFFF"/>
+                </a:gs>
+                <a:gs pos="100000">
+                  <a:schemeClr val="tx1">
+                    <a:alpha val="0"/>
+                  </a:schemeClr>
+                </a:gs>
+              </a:gsLst>
+              <a:path path="circle">
+                <a:fillToRect l="50000" t="50000" r="50000" b="50000"/>
+              </a:path>
+              <a:tileRect/>
+            </a:gradFill>
+            <a:miter lim="800000"/>
+          </a:ln>
+          <a:effectLst>
+            <a:outerShdw blurRad="254000" algn="tl" rotWithShape="0">
+              <a:srgbClr val="000000">
+                <a:alpha val="43000"/>
+              </a:srgbClr>
+            </a:outerShdw>
+          </a:effectLst>
+        </p:spPr>
+      </p:pic>
+    </p:spTree>
+    <p:extLst>
+      <p:ext uri="{BB962C8B-B14F-4D97-AF65-F5344CB8AC3E}">
+        <p14:creationId xmlns:p14="http://schemas.microsoft.com/office/powerpoint/2010/main" val="1355621239"/>
+      </p:ext>
+    </p:extLst>
+  </p:cSld>
+  <p:clrMapOvr>
+    <a:masterClrMapping/>
+  </p:clrMapOvr>
+</p:sld>
+</file>
+
+<file path=ppt/slides/slide11.xml><?xml version="1.0" encoding="utf-8"?>
+<p:sld xmlns:a="http://schemas.openxmlformats.org/drawingml/2006/main" xmlns:r="http://schemas.openxmlformats.org/officeDocument/2006/relationships" xmlns:p="http://schemas.openxmlformats.org/presentationml/2006/main">
+  <p:cSld>
+    <p:spTree>
+      <p:nvGrpSpPr>
+        <p:cNvPr id="1" name=""/>
+        <p:cNvGrpSpPr/>
+        <p:nvPr/>
+      </p:nvGrpSpPr>
+      <p:grpSpPr>
+        <a:xfrm>
+          <a:off x="0" y="0"/>
+          <a:ext cx="0" cy="0"/>
+          <a:chOff x="0" y="0"/>
+          <a:chExt cx="0" cy="0"/>
+        </a:xfrm>
+      </p:grpSpPr>
+      <p:sp>
+        <p:nvSpPr>
+          <p:cNvPr id="2" name="Title 1">
+            <a:extLst>
+              <a:ext uri="{FF2B5EF4-FFF2-40B4-BE49-F238E27FC236}">
+                <a16:creationId xmlns:a16="http://schemas.microsoft.com/office/drawing/2014/main" id="{D1AD8AA1-E94F-A08F-54D7-9A2598B91127}"/>
+              </a:ext>
+            </a:extLst>
+          </p:cNvPr>
+          <p:cNvSpPr>
+            <a:spLocks noGrp="1"/>
+          </p:cNvSpPr>
+          <p:nvPr>
+            <p:ph type="title"/>
+          </p:nvPr>
+        </p:nvSpPr>
+        <p:spPr/>
+        <p:txBody>
+          <a:bodyPr numCol="1"/>
+          <a:lstStyle/>
+          <a:p>
+            <a:pPr algn="ctr"/>
+            <a:r>
+              <a:rPr lang="en-GB" dirty="0"/>
+              <a:t>Conclusion</a:t>
+            </a:r>
+          </a:p>
+        </p:txBody>
+      </p:sp>
+      <p:sp>
+        <p:nvSpPr>
+          <p:cNvPr id="3" name="Content Placeholder 2">
+            <a:extLst>
+              <a:ext uri="{FF2B5EF4-FFF2-40B4-BE49-F238E27FC236}">
+                <a16:creationId xmlns:a16="http://schemas.microsoft.com/office/drawing/2014/main" id="{621C0F2A-4240-9B86-9819-7C0895D1FAF6}"/>
+              </a:ext>
+            </a:extLst>
+          </p:cNvPr>
+          <p:cNvSpPr>
+            <a:spLocks noGrp="1"/>
+          </p:cNvSpPr>
+          <p:nvPr>
+            <p:ph idx="1"/>
+          </p:nvPr>
+        </p:nvSpPr>
+        <p:spPr>
+          <a:xfrm>
+            <a:off x="457200" y="2172928"/>
+            <a:ext cx="7772400" cy="3106995"/>
+          </a:xfrm>
+        </p:spPr>
+        <p:txBody>
+          <a:bodyPr/>
+          <a:lstStyle/>
+          <a:p>
+            <a:pPr marL="0" indent="0">
+              <a:buNone/>
+            </a:pPr>
+            <a:r>
+              <a:rPr lang="en-GB" dirty="0"/>
+              <a:t>The transition from Logistic Regression to XGBoost significantly improved churn detection performance. While the baseline model struggled to identify at-risk customers, the final XGBoost model achieved 94% overall accuracy and detected 78% of churn cases. This substantial improvement enhances the model’s practical business value, enabling more effective and proactive customer retention strategies. Based on its balanced performance and strong predictive capability, XGBoost is recommended for deployment.</a:t>
+            </a:r>
+          </a:p>
+        </p:txBody>
+      </p:sp>
+    </p:spTree>
+    <p:extLst>
+      <p:ext uri="{BB962C8B-B14F-4D97-AF65-F5344CB8AC3E}">
+        <p14:creationId xmlns:p14="http://schemas.microsoft.com/office/powerpoint/2010/main" val="3450555422"/>
+      </p:ext>
+    </p:extLst>
+  </p:cSld>
+  <p:clrMapOvr>
+    <a:masterClrMapping/>
+  </p:clrMapOvr>
+</p:sld>
+</file>
+
+<file path=ppt/slides/slide12.xml><?xml version="1.0" encoding="utf-8"?>
 <p:sld xmlns:a="http://schemas.openxmlformats.org/drawingml/2006/main" xmlns:r="http://schemas.openxmlformats.org/officeDocument/2006/relationships" xmlns:p="http://schemas.openxmlformats.org/presentationml/2006/main">
   <p:cSld>
     <p:spTree>
@@ -6194,15 +6523,7 @@
           <a:p>
             <a:r>
               <a:rPr lang="en-GB" dirty="0"/>
-              <a:t>Confusion Matrix to </a:t>
-            </a:r>
-            <a:r>
-              <a:rPr lang="en-GB" dirty="0" err="1"/>
-              <a:t>analyze</a:t>
-            </a:r>
-            <a:r>
-              <a:rPr lang="en-GB" dirty="0"/>
-              <a:t> prediction errors in detail.</a:t>
+              <a:t>Confusion Matrix to analyze prediction errors in detail.</a:t>
             </a:r>
             <a:endParaRPr dirty="0"/>
           </a:p>
@@ -6736,12 +7057,8 @@
           <a:p>
             <a:pPr algn="ctr"/>
             <a:r>
-              <a:rPr dirty="0"/>
-              <a:t> Conclusion</a:t>
-            </a:r>
-            <a:r>
               <a:rPr lang="en-GB" dirty="0"/>
-              <a:t> and recommendation</a:t>
+              <a:t>Recommendation and next steps</a:t>
             </a:r>
             <a:endParaRPr dirty="0"/>
           </a:p>
@@ -6774,8 +7091,25 @@
             </a:pPr>
             <a:r>
               <a:rPr lang="en-GB" sz="1800" dirty="0"/>
-              <a:t>While the model demonstrates strong overall accuracy (86%), it performs poorly in identifying customers at risk of churn, capturing only 24% of actual churn cases. As a result, the model is not yet suitable for deployment. Additional refinement is necessary to improve churn detection and minimize potential business risk.</a:t>
-            </a:r>
+              <a:t>While the model demonstrates strong overall accuracy (86%), it performs poorly in identifying customers at risk of churn, capturing only 24% of actual churn cases. As a result, the model is not yet suitable for deployment. </a:t>
+            </a:r>
+            <a:r>
+              <a:rPr lang="en-GB" dirty="0"/>
+              <a:t>To address the this , I would recommend using an </a:t>
+            </a:r>
+            <a:r>
+              <a:rPr lang="en-GB" b="1" dirty="0"/>
+              <a:t>XGBoost Model</a:t>
+            </a:r>
+            <a:r>
+              <a:rPr lang="en-GB" dirty="0"/>
+              <a:t> to better handle class imbalance and improve the detection of minority-class churners</a:t>
+            </a:r>
+          </a:p>
+          <a:p>
+            <a:pPr marL="457200" lvl="1" indent="0">
+              <a:buNone/>
+            </a:pPr>
             <a:endParaRPr sz="1800" dirty="0"/>
           </a:p>
         </p:txBody>

</xml_diff>

<commit_message>
fine tune readme file
</commit_message>
<xml_diff>
--- a/SyriaTel_Churn_Executive_Presentation.pptx
+++ b/SyriaTel_Churn_Executive_Presentation.pptx
@@ -358,7 +358,7 @@
           <a:p>
             <a:fld id="{5BCAD085-E8A6-8845-BD4E-CB4CCA059FC4}" type="datetimeFigureOut">
               <a:rPr lang="en-US" smtClean="0"/>
-              <a:t>2/11/2026</a:t>
+              <a:t>2/12/2026</a:t>
             </a:fld>
             <a:endParaRPr lang="en-US"/>
           </a:p>
@@ -662,7 +662,7 @@
           <a:p>
             <a:fld id="{5BCAD085-E8A6-8845-BD4E-CB4CCA059FC4}" type="datetimeFigureOut">
               <a:rPr lang="en-US" smtClean="0"/>
-              <a:t>2/11/2026</a:t>
+              <a:t>2/12/2026</a:t>
             </a:fld>
             <a:endParaRPr lang="en-US"/>
           </a:p>
@@ -940,7 +940,7 @@
           <a:p>
             <a:fld id="{5BCAD085-E8A6-8845-BD4E-CB4CCA059FC4}" type="datetimeFigureOut">
               <a:rPr lang="en-US" smtClean="0"/>
-              <a:t>2/11/2026</a:t>
+              <a:t>2/12/2026</a:t>
             </a:fld>
             <a:endParaRPr lang="en-US"/>
           </a:p>
@@ -1510,7 +1510,7 @@
           <a:p>
             <a:fld id="{5BCAD085-E8A6-8845-BD4E-CB4CCA059FC4}" type="datetimeFigureOut">
               <a:rPr lang="en-US" smtClean="0"/>
-              <a:t>2/11/2026</a:t>
+              <a:t>2/12/2026</a:t>
             </a:fld>
             <a:endParaRPr lang="en-US"/>
           </a:p>
@@ -1788,7 +1788,7 @@
           <a:p>
             <a:fld id="{5BCAD085-E8A6-8845-BD4E-CB4CCA059FC4}" type="datetimeFigureOut">
               <a:rPr lang="en-US" smtClean="0"/>
-              <a:t>2/11/2026</a:t>
+              <a:t>2/12/2026</a:t>
             </a:fld>
             <a:endParaRPr lang="en-US"/>
           </a:p>
@@ -2350,7 +2350,7 @@
           <a:p>
             <a:fld id="{5BCAD085-E8A6-8845-BD4E-CB4CCA059FC4}" type="datetimeFigureOut">
               <a:rPr lang="en-US" smtClean="0"/>
-              <a:t>2/11/2026</a:t>
+              <a:t>2/12/2026</a:t>
             </a:fld>
             <a:endParaRPr lang="en-US"/>
           </a:p>
@@ -2677,7 +2677,7 @@
           <a:p>
             <a:fld id="{5BCAD085-E8A6-8845-BD4E-CB4CCA059FC4}" type="datetimeFigureOut">
               <a:rPr lang="en-US" smtClean="0"/>
-              <a:t>2/11/2026</a:t>
+              <a:t>2/12/2026</a:t>
             </a:fld>
             <a:endParaRPr lang="en-US"/>
           </a:p>
@@ -2888,7 +2888,7 @@
           <a:p>
             <a:fld id="{5BCAD085-E8A6-8845-BD4E-CB4CCA059FC4}" type="datetimeFigureOut">
               <a:rPr lang="en-US" smtClean="0"/>
-              <a:t>2/11/2026</a:t>
+              <a:t>2/12/2026</a:t>
             </a:fld>
             <a:endParaRPr lang="en-US"/>
           </a:p>
@@ -3104,7 +3104,7 @@
           <a:p>
             <a:fld id="{5BCAD085-E8A6-8845-BD4E-CB4CCA059FC4}" type="datetimeFigureOut">
               <a:rPr lang="en-US" smtClean="0"/>
-              <a:t>2/11/2026</a:t>
+              <a:t>2/12/2026</a:t>
             </a:fld>
             <a:endParaRPr lang="en-US"/>
           </a:p>
@@ -3310,7 +3310,7 @@
           <a:p>
             <a:fld id="{5BCAD085-E8A6-8845-BD4E-CB4CCA059FC4}" type="datetimeFigureOut">
               <a:rPr lang="en-US" smtClean="0"/>
-              <a:t>2/11/2026</a:t>
+              <a:t>2/12/2026</a:t>
             </a:fld>
             <a:endParaRPr lang="en-US"/>
           </a:p>
@@ -3588,7 +3588,7 @@
           <a:p>
             <a:fld id="{5BCAD085-E8A6-8845-BD4E-CB4CCA059FC4}" type="datetimeFigureOut">
               <a:rPr lang="en-US" smtClean="0"/>
-              <a:t>2/11/2026</a:t>
+              <a:t>2/12/2026</a:t>
             </a:fld>
             <a:endParaRPr lang="en-US"/>
           </a:p>
@@ -3854,7 +3854,7 @@
           <a:p>
             <a:fld id="{5BCAD085-E8A6-8845-BD4E-CB4CCA059FC4}" type="datetimeFigureOut">
               <a:rPr lang="en-US" smtClean="0"/>
-              <a:t>2/11/2026</a:t>
+              <a:t>2/12/2026</a:t>
             </a:fld>
             <a:endParaRPr lang="en-US"/>
           </a:p>
@@ -4260,7 +4260,7 @@
           <a:p>
             <a:fld id="{5BCAD085-E8A6-8845-BD4E-CB4CCA059FC4}" type="datetimeFigureOut">
               <a:rPr lang="en-US" smtClean="0"/>
-              <a:t>2/11/2026</a:t>
+              <a:t>2/12/2026</a:t>
             </a:fld>
             <a:endParaRPr lang="en-US"/>
           </a:p>
@@ -4419,7 +4419,7 @@
           <a:p>
             <a:fld id="{5BCAD085-E8A6-8845-BD4E-CB4CCA059FC4}" type="datetimeFigureOut">
               <a:rPr lang="en-US" smtClean="0"/>
-              <a:t>2/11/2026</a:t>
+              <a:t>2/12/2026</a:t>
             </a:fld>
             <a:endParaRPr lang="en-US"/>
           </a:p>
@@ -4544,7 +4544,7 @@
           <a:p>
             <a:fld id="{5BCAD085-E8A6-8845-BD4E-CB4CCA059FC4}" type="datetimeFigureOut">
               <a:rPr lang="en-US" smtClean="0"/>
-              <a:t>2/11/2026</a:t>
+              <a:t>2/12/2026</a:t>
             </a:fld>
             <a:endParaRPr lang="en-US"/>
           </a:p>
@@ -4829,7 +4829,7 @@
           <a:p>
             <a:fld id="{5BCAD085-E8A6-8845-BD4E-CB4CCA059FC4}" type="datetimeFigureOut">
               <a:rPr lang="en-US" smtClean="0"/>
-              <a:t>2/11/2026</a:t>
+              <a:t>2/12/2026</a:t>
             </a:fld>
             <a:endParaRPr lang="en-US"/>
           </a:p>
@@ -5123,7 +5123,7 @@
           <a:p>
             <a:fld id="{5BCAD085-E8A6-8845-BD4E-CB4CCA059FC4}" type="datetimeFigureOut">
               <a:rPr lang="en-US" smtClean="0"/>
-              <a:t>2/11/2026</a:t>
+              <a:t>2/12/2026</a:t>
             </a:fld>
             <a:endParaRPr lang="en-US"/>
           </a:p>
@@ -5337,7 +5337,7 @@
           <a:p>
             <a:fld id="{5BCAD085-E8A6-8845-BD4E-CB4CCA059FC4}" type="datetimeFigureOut">
               <a:rPr lang="en-US" smtClean="0"/>
-              <a:t>2/11/2026</a:t>
+              <a:t>2/12/2026</a:t>
             </a:fld>
             <a:endParaRPr lang="en-US"/>
           </a:p>
@@ -6177,9 +6177,14 @@
             <p:ph type="title"/>
           </p:nvPr>
         </p:nvSpPr>
-        <p:spPr/>
-        <p:txBody>
-          <a:bodyPr numCol="1"/>
+        <p:spPr>
+          <a:xfrm>
+            <a:off x="457200" y="609602"/>
+            <a:ext cx="7772400" cy="737417"/>
+          </a:xfrm>
+        </p:spPr>
+        <p:txBody>
+          <a:bodyPr numCol="1" anchor="t"/>
           <a:lstStyle/>
           <a:p>
             <a:pPr algn="ctr"/>
@@ -6213,7 +6218,7 @@
           </a:xfrm>
         </p:spPr>
         <p:txBody>
-          <a:bodyPr/>
+          <a:bodyPr anchor="t"/>
           <a:lstStyle/>
           <a:p>
             <a:pPr marL="0" indent="0">
@@ -6302,8 +6307,8 @@
         </p:nvSpPr>
         <p:spPr>
           <a:xfrm>
-            <a:off x="685800" y="1442821"/>
-            <a:ext cx="7772400" cy="3649133"/>
+            <a:off x="685800" y="1442822"/>
+            <a:ext cx="7772400" cy="2391760"/>
           </a:xfrm>
         </p:spPr>
         <p:txBody>
@@ -6616,7 +6621,7 @@
             </a:pPr>
             <a:r>
               <a:rPr lang="en-GB" dirty="0"/>
-              <a:t>The model achieves an overall accuracy of 85.9% across 667 test samples. However, the dataset is highly imbalanced, with 570 non-churn customers compared to only 97 churn customers. This imbalance means the high accuracy is largely driven by the model’s strong performance on the majority (non-churn) class. As a result, accuracy alone may overstate the model’s effectiveness in detecting churn, and additional metrics are required to properly assess its ability to identify at-risk customers.</a:t>
+              <a:t>Logistic Regression model achieves an overall accuracy of 85.9% across 667 test samples. However, the dataset is highly imbalanced, with 570 non-churn customers compared to only 97 churn customers. This imbalance means the high accuracy is largely driven by the model’s strong performance on the majority (non-churn) class. As a result, accuracy alone may overstate the model’s effectiveness in detecting churn, and additional metrics are required to properly assess its ability to identify at-risk customers.</a:t>
             </a:r>
             <a:endParaRPr dirty="0"/>
           </a:p>
@@ -7082,7 +7087,7 @@
         </p:spPr>
         <p:txBody>
           <a:bodyPr anchor="t">
-            <a:normAutofit/>
+            <a:normAutofit lnSpcReduction="10000"/>
           </a:bodyPr>
           <a:lstStyle/>
           <a:p>
@@ -7091,25 +7096,16 @@
             </a:pPr>
             <a:r>
               <a:rPr lang="en-GB" sz="1800" dirty="0"/>
-              <a:t>While the model demonstrates strong overall accuracy (86%), it performs poorly in identifying customers at risk of churn, capturing only 24% of actual churn cases. As a result, the model is not yet suitable for deployment. </a:t>
-            </a:r>
-            <a:r>
-              <a:rPr lang="en-GB" dirty="0"/>
-              <a:t>To address the this , I would recommend using an </a:t>
-            </a:r>
-            <a:r>
-              <a:rPr lang="en-GB" b="1" dirty="0"/>
-              <a:t>XGBoost Model</a:t>
-            </a:r>
-            <a:r>
-              <a:rPr lang="en-GB" dirty="0"/>
-              <a:t> to better handle class imbalance and improve the detection of minority-class churners</a:t>
-            </a:r>
-          </a:p>
-          <a:p>
-            <a:pPr marL="457200" lvl="1" indent="0">
-              <a:buNone/>
-            </a:pPr>
+              <a:t>Although the Logistic Regression model achieves strong overall accuracy (86%), it fails to reliably identify customers at risk of churn, detecting only 24% of actual churn cases. This limitation makes the model unsuitable for deployment. To mitigate this risk, adopting an </a:t>
+            </a:r>
+            <a:r>
+              <a:rPr lang="en-GB" sz="1800" dirty="0" err="1"/>
+              <a:t>XGBoost</a:t>
+            </a:r>
+            <a:r>
+              <a:rPr lang="en-GB" sz="1800" dirty="0"/>
+              <a:t> model is recommended, as it better addresses class imbalance and substantially improves the identification of at-risk customers, enabling more effective retention strategies.</a:t>
+            </a:r>
             <a:endParaRPr sz="1800" dirty="0"/>
           </a:p>
         </p:txBody>

</xml_diff>